<commit_message>
"data sets and hive script"
</commit_message>
<xml_diff>
--- a/Mid-term slides.pptx
+++ b/Mid-term slides.pptx
@@ -15,7 +15,8 @@
     <p:sldId id="263" r:id="rId9"/>
     <p:sldId id="264" r:id="rId10"/>
     <p:sldId id="265" r:id="rId11"/>
-    <p:sldId id="266" r:id="rId12"/>
+    <p:sldId id="267" r:id="rId12"/>
+    <p:sldId id="266" r:id="rId13"/>
   </p:sldIdLst>
   <p:sldSz cx="9144000" cy="6858000" type="screen4x3"/>
   <p:notesSz cx="6858000" cy="9144000"/>
@@ -3216,9 +3217,22 @@
           <a:bodyPr/>
           <a:lstStyle/>
           <a:p>
+            <a:pPr marL="0" indent="0">
+              <a:buNone/>
+            </a:pPr>
+            <a:r>
+              <a:rPr lang="en-US" sz="1800" dirty="0" smtClean="0"/>
+              <a:t>Count how many books were published each year</a:t>
+            </a:r>
+          </a:p>
+          <a:p>
+            <a:r>
+              <a:rPr lang="en-US" sz="1800" dirty="0" smtClean="0"/>
+              <a:t>hive</a:t>
+            </a:r>
             <a:r>
               <a:rPr lang="en-US" sz="1800" dirty="0"/>
-              <a:t>hive&gt; </a:t>
+              <a:t>&gt; </a:t>
             </a:r>
             <a:r>
               <a:rPr lang="en-US" sz="1800" b="1" dirty="0"/>
@@ -3256,6 +3270,12 @@
               <a:rPr lang="en-US" sz="1800" b="1" dirty="0" smtClean="0"/>
               <a:t>;</a:t>
             </a:r>
+          </a:p>
+          <a:p>
+            <a:pPr marL="0" indent="0">
+              <a:buNone/>
+            </a:pPr>
+            <a:endParaRPr lang="en-US" sz="1800" b="1" dirty="0" smtClean="0"/>
           </a:p>
           <a:p>
             <a:endParaRPr lang="en-US" sz="1800" b="1" dirty="0"/>
@@ -3290,7 +3310,7 @@
         </p:blipFill>
         <p:spPr>
           <a:xfrm>
-            <a:off x="0" y="1143000"/>
+            <a:off x="0" y="1305800"/>
             <a:ext cx="8997468" cy="5715000"/>
           </a:xfrm>
           <a:prstGeom prst="rect">
@@ -3330,6 +3350,100 @@
       </p:grpSpPr>
       <p:sp>
         <p:nvSpPr>
+          <p:cNvPr id="3" name="Content Placeholder 2"/>
+          <p:cNvSpPr>
+            <a:spLocks noGrp="1"/>
+          </p:cNvSpPr>
+          <p:nvPr>
+            <p:ph idx="1"/>
+          </p:nvPr>
+        </p:nvSpPr>
+        <p:spPr>
+          <a:xfrm>
+            <a:off x="180417" y="167549"/>
+            <a:ext cx="8229600" cy="4525963"/>
+          </a:xfrm>
+        </p:spPr>
+        <p:txBody>
+          <a:bodyPr>
+            <a:normAutofit/>
+          </a:bodyPr>
+          <a:lstStyle/>
+          <a:p>
+            <a:r>
+              <a:rPr lang="en-US" sz="1800" dirty="0" smtClean="0"/>
+              <a:t>Only show years when total books # published are bigger </a:t>
+            </a:r>
+            <a:r>
+              <a:rPr lang="en-US" sz="1800" smtClean="0"/>
+              <a:t>than 1000</a:t>
+            </a:r>
+            <a:endParaRPr lang="en-US" sz="1800" dirty="0" smtClean="0"/>
+          </a:p>
+        </p:txBody>
+      </p:sp>
+      <p:pic>
+        <p:nvPicPr>
+          <p:cNvPr id="5" name="Picture 4" descr="Screen Shot 2013-10-28 at 4.30.51 PM.png"/>
+          <p:cNvPicPr>
+            <a:picLocks noChangeAspect="1"/>
+          </p:cNvPicPr>
+          <p:nvPr/>
+        </p:nvPicPr>
+        <p:blipFill>
+          <a:blip r:embed="rId2">
+            <a:extLst>
+              <a:ext uri="{28A0092B-C50C-407E-A947-70E740481C1C}">
+                <a14:useLocalDpi xmlns:a14="http://schemas.microsoft.com/office/drawing/2010/main" val="0"/>
+              </a:ext>
+            </a:extLst>
+          </a:blip>
+          <a:stretch>
+            <a:fillRect/>
+          </a:stretch>
+        </p:blipFill>
+        <p:spPr>
+          <a:xfrm>
+            <a:off x="0" y="864542"/>
+            <a:ext cx="9144000" cy="6286500"/>
+          </a:xfrm>
+          <a:prstGeom prst="rect">
+            <a:avLst/>
+          </a:prstGeom>
+        </p:spPr>
+      </p:pic>
+    </p:spTree>
+    <p:extLst>
+      <p:ext uri="{BB962C8B-B14F-4D97-AF65-F5344CB8AC3E}">
+        <p14:creationId xmlns:p14="http://schemas.microsoft.com/office/powerpoint/2010/main" val="1510004362"/>
+      </p:ext>
+    </p:extLst>
+  </p:cSld>
+  <p:clrMapOvr>
+    <a:masterClrMapping/>
+  </p:clrMapOvr>
+</p:sld>
+</file>
+
+<file path=ppt/slides/slide12.xml><?xml version="1.0" encoding="utf-8"?>
+<p:sld xmlns:a="http://schemas.openxmlformats.org/drawingml/2006/main" xmlns:r="http://schemas.openxmlformats.org/officeDocument/2006/relationships" xmlns:p="http://schemas.openxmlformats.org/presentationml/2006/main">
+  <p:cSld>
+    <p:spTree>
+      <p:nvGrpSpPr>
+        <p:cNvPr id="1" name=""/>
+        <p:cNvGrpSpPr/>
+        <p:nvPr/>
+      </p:nvGrpSpPr>
+      <p:grpSpPr>
+        <a:xfrm>
+          <a:off x="0" y="0"/>
+          <a:ext cx="0" cy="0"/>
+          <a:chOff x="0" y="0"/>
+          <a:chExt cx="0" cy="0"/>
+        </a:xfrm>
+      </p:grpSpPr>
+      <p:sp>
+        <p:nvSpPr>
           <p:cNvPr id="2" name="Title 1"/>
           <p:cNvSpPr>
             <a:spLocks noGrp="1"/>
@@ -4348,11 +4462,7 @@
           <a:p>
             <a:r>
               <a:rPr lang="en-US" dirty="0" smtClean="0"/>
-              <a:t>Datasets </a:t>
-            </a:r>
-            <a:r>
-              <a:rPr lang="en-US" dirty="0" smtClean="0"/>
-              <a:t>(CSV format) </a:t>
+              <a:t>Datasets (CSV format) </a:t>
             </a:r>
           </a:p>
           <a:p>
@@ -4645,13 +4755,8 @@
           <a:p>
             <a:r>
               <a:rPr lang="en-US" sz="5000" dirty="0" smtClean="0"/>
-              <a:t>Run hive and create </a:t>
-            </a:r>
-            <a:r>
-              <a:rPr lang="en-US" sz="5000" dirty="0" smtClean="0"/>
-              <a:t>table for datasets</a:t>
-            </a:r>
-            <a:endParaRPr lang="en-US" sz="5000" dirty="0" smtClean="0"/>
+              <a:t>Run hive and create table for datasets</a:t>
+            </a:r>
           </a:p>
           <a:p>
             <a:r>

</xml_diff>